<commit_message>
Clean up,experimentation, and tuning.
</commit_message>
<xml_diff>
--- a/Abalone Age Data.pptx
+++ b/Abalone Age Data.pptx
@@ -201,7 +201,7 @@
           <a:p>
             <a:fld id="{442E7825-15E8-47EB-B0FA-8905691C0EE4}" type="datetimeFigureOut">
               <a:rPr lang="en-US" smtClean="0"/>
-              <a:t>2/6/2018</a:t>
+              <a:t>2/8/2018</a:t>
             </a:fld>
             <a:endParaRPr lang="en-US"/>
           </a:p>
@@ -735,7 +735,15 @@
           <a:p>
             <a:r>
               <a:rPr lang="en-US" dirty="0"/>
-              <a:t>Overfishing and climate change a concern, but lots on the market is farmed for “ranched.”</a:t>
+              <a:t>Overfishing and climate change a concern, but lots on the market is </a:t>
+            </a:r>
+            <a:r>
+              <a:rPr lang="en-US"/>
+              <a:t>farmed or </a:t>
+            </a:r>
+            <a:r>
+              <a:rPr lang="en-US" dirty="0"/>
+              <a:t>“ranched.”</a:t>
             </a:r>
           </a:p>
           <a:p>
@@ -1230,7 +1238,7 @@
           <a:p>
             <a:fld id="{4AE31087-D8F3-4684-9C35-C02728DC43D6}" type="datetimeFigureOut">
               <a:rPr lang="en-US" smtClean="0"/>
-              <a:t>2/6/2018</a:t>
+              <a:t>2/8/2018</a:t>
             </a:fld>
             <a:endParaRPr lang="en-US"/>
           </a:p>
@@ -1428,7 +1436,7 @@
           <a:p>
             <a:fld id="{4AE31087-D8F3-4684-9C35-C02728DC43D6}" type="datetimeFigureOut">
               <a:rPr lang="en-US" smtClean="0"/>
-              <a:t>2/6/2018</a:t>
+              <a:t>2/8/2018</a:t>
             </a:fld>
             <a:endParaRPr lang="en-US"/>
           </a:p>
@@ -1636,7 +1644,7 @@
           <a:p>
             <a:fld id="{4AE31087-D8F3-4684-9C35-C02728DC43D6}" type="datetimeFigureOut">
               <a:rPr lang="en-US" smtClean="0"/>
-              <a:t>2/6/2018</a:t>
+              <a:t>2/8/2018</a:t>
             </a:fld>
             <a:endParaRPr lang="en-US"/>
           </a:p>
@@ -1834,7 +1842,7 @@
           <a:p>
             <a:fld id="{4AE31087-D8F3-4684-9C35-C02728DC43D6}" type="datetimeFigureOut">
               <a:rPr lang="en-US" smtClean="0"/>
-              <a:t>2/6/2018</a:t>
+              <a:t>2/8/2018</a:t>
             </a:fld>
             <a:endParaRPr lang="en-US"/>
           </a:p>
@@ -2109,7 +2117,7 @@
           <a:p>
             <a:fld id="{4AE31087-D8F3-4684-9C35-C02728DC43D6}" type="datetimeFigureOut">
               <a:rPr lang="en-US" smtClean="0"/>
-              <a:t>2/6/2018</a:t>
+              <a:t>2/8/2018</a:t>
             </a:fld>
             <a:endParaRPr lang="en-US"/>
           </a:p>
@@ -2374,7 +2382,7 @@
           <a:p>
             <a:fld id="{4AE31087-D8F3-4684-9C35-C02728DC43D6}" type="datetimeFigureOut">
               <a:rPr lang="en-US" smtClean="0"/>
-              <a:t>2/6/2018</a:t>
+              <a:t>2/8/2018</a:t>
             </a:fld>
             <a:endParaRPr lang="en-US"/>
           </a:p>
@@ -2786,7 +2794,7 @@
           <a:p>
             <a:fld id="{4AE31087-D8F3-4684-9C35-C02728DC43D6}" type="datetimeFigureOut">
               <a:rPr lang="en-US" smtClean="0"/>
-              <a:t>2/6/2018</a:t>
+              <a:t>2/8/2018</a:t>
             </a:fld>
             <a:endParaRPr lang="en-US"/>
           </a:p>
@@ -2927,7 +2935,7 @@
           <a:p>
             <a:fld id="{4AE31087-D8F3-4684-9C35-C02728DC43D6}" type="datetimeFigureOut">
               <a:rPr lang="en-US" smtClean="0"/>
-              <a:t>2/6/2018</a:t>
+              <a:t>2/8/2018</a:t>
             </a:fld>
             <a:endParaRPr lang="en-US"/>
           </a:p>
@@ -3040,7 +3048,7 @@
           <a:p>
             <a:fld id="{4AE31087-D8F3-4684-9C35-C02728DC43D6}" type="datetimeFigureOut">
               <a:rPr lang="en-US" smtClean="0"/>
-              <a:t>2/6/2018</a:t>
+              <a:t>2/8/2018</a:t>
             </a:fld>
             <a:endParaRPr lang="en-US"/>
           </a:p>
@@ -3351,7 +3359,7 @@
           <a:p>
             <a:fld id="{4AE31087-D8F3-4684-9C35-C02728DC43D6}" type="datetimeFigureOut">
               <a:rPr lang="en-US" smtClean="0"/>
-              <a:t>2/6/2018</a:t>
+              <a:t>2/8/2018</a:t>
             </a:fld>
             <a:endParaRPr lang="en-US"/>
           </a:p>
@@ -3639,7 +3647,7 @@
           <a:p>
             <a:fld id="{4AE31087-D8F3-4684-9C35-C02728DC43D6}" type="datetimeFigureOut">
               <a:rPr lang="en-US" smtClean="0"/>
-              <a:t>2/6/2018</a:t>
+              <a:t>2/8/2018</a:t>
             </a:fld>
             <a:endParaRPr lang="en-US"/>
           </a:p>
@@ -3880,7 +3888,7 @@
           <a:p>
             <a:fld id="{4AE31087-D8F3-4684-9C35-C02728DC43D6}" type="datetimeFigureOut">
               <a:rPr lang="en-US" smtClean="0"/>
-              <a:t>2/6/2018</a:t>
+              <a:t>2/8/2018</a:t>
             </a:fld>
             <a:endParaRPr lang="en-US"/>
           </a:p>

</xml_diff>